<commit_message>
Update Report and diagram templet
6. System Detail design
6.4. Chatting with eable login user
</commit_message>
<xml_diff>
--- a/Diagram Templet.pptx
+++ b/Diagram Templet.pptx
@@ -8,6 +8,7 @@
     <p:sldId id="258" r:id="rId2"/>
     <p:sldId id="259" r:id="rId3"/>
     <p:sldId id="260" r:id="rId4"/>
+    <p:sldId id="261" r:id="rId5"/>
   </p:sldIdLst>
   <p:sldSz cx="12192000" cy="6858000"/>
   <p:notesSz cx="6858000" cy="9144000"/>
@@ -9265,6 +9266,2072 @@
 </p:sld>
 </file>
 
+<file path=ppt/slides/slide4.xml><?xml version="1.0" encoding="utf-8"?>
+<p:sld xmlns:a="http://schemas.openxmlformats.org/drawingml/2006/main" xmlns:r="http://schemas.openxmlformats.org/officeDocument/2006/relationships" xmlns:p="http://schemas.openxmlformats.org/presentationml/2006/main">
+  <p:cSld>
+    <p:spTree>
+      <p:nvGrpSpPr>
+        <p:cNvPr id="1" name=""/>
+        <p:cNvGrpSpPr/>
+        <p:nvPr/>
+      </p:nvGrpSpPr>
+      <p:grpSpPr>
+        <a:xfrm>
+          <a:off x="0" y="0"/>
+          <a:ext cx="0" cy="0"/>
+          <a:chOff x="0" y="0"/>
+          <a:chExt cx="0" cy="0"/>
+        </a:xfrm>
+      </p:grpSpPr>
+      <p:grpSp>
+        <p:nvGrpSpPr>
+          <p:cNvPr id="89" name="그룹 88">
+            <a:extLst>
+              <a:ext uri="{FF2B5EF4-FFF2-40B4-BE49-F238E27FC236}">
+                <a16:creationId xmlns:a16="http://schemas.microsoft.com/office/drawing/2014/main" id="{EA501673-C809-4B16-B965-FB085C5C3516}"/>
+              </a:ext>
+            </a:extLst>
+          </p:cNvPr>
+          <p:cNvGrpSpPr/>
+          <p:nvPr/>
+        </p:nvGrpSpPr>
+        <p:grpSpPr>
+          <a:xfrm>
+            <a:off x="452250" y="274176"/>
+            <a:ext cx="11062088" cy="6339688"/>
+            <a:chOff x="452250" y="274176"/>
+            <a:chExt cx="11062088" cy="6339688"/>
+          </a:xfrm>
+        </p:grpSpPr>
+        <p:sp>
+          <p:nvSpPr>
+            <p:cNvPr id="88" name="직사각형 87">
+              <a:extLst>
+                <a:ext uri="{FF2B5EF4-FFF2-40B4-BE49-F238E27FC236}">
+                  <a16:creationId xmlns:a16="http://schemas.microsoft.com/office/drawing/2014/main" id="{A9B48869-3172-4EE4-8F76-BA940D455BEF}"/>
+                </a:ext>
+              </a:extLst>
+            </p:cNvPr>
+            <p:cNvSpPr/>
+            <p:nvPr/>
+          </p:nvSpPr>
+          <p:spPr>
+            <a:xfrm>
+              <a:off x="452250" y="274176"/>
+              <a:ext cx="11062088" cy="6339688"/>
+            </a:xfrm>
+            <a:prstGeom prst="rect">
+              <a:avLst/>
+            </a:prstGeom>
+            <a:solidFill>
+              <a:schemeClr val="bg1"/>
+            </a:solidFill>
+            <a:ln>
+              <a:noFill/>
+            </a:ln>
+          </p:spPr>
+          <p:style>
+            <a:lnRef idx="2">
+              <a:schemeClr val="accent1">
+                <a:shade val="50000"/>
+              </a:schemeClr>
+            </a:lnRef>
+            <a:fillRef idx="1">
+              <a:schemeClr val="accent1"/>
+            </a:fillRef>
+            <a:effectRef idx="0">
+              <a:schemeClr val="accent1"/>
+            </a:effectRef>
+            <a:fontRef idx="minor">
+              <a:schemeClr val="lt1"/>
+            </a:fontRef>
+          </p:style>
+          <p:txBody>
+            <a:bodyPr rtlCol="0" anchor="ctr"/>
+            <a:lstStyle/>
+            <a:p>
+              <a:pPr algn="ctr"/>
+              <a:endParaRPr lang="ko-KR" altLang="en-US" u="sng" dirty="0"/>
+            </a:p>
+          </p:txBody>
+        </p:sp>
+        <p:grpSp>
+          <p:nvGrpSpPr>
+            <p:cNvPr id="4" name="그룹 3">
+              <a:extLst>
+                <a:ext uri="{FF2B5EF4-FFF2-40B4-BE49-F238E27FC236}">
+                  <a16:creationId xmlns:a16="http://schemas.microsoft.com/office/drawing/2014/main" id="{4040FD69-A237-4E68-865E-1F2A9F12C0D0}"/>
+                </a:ext>
+              </a:extLst>
+            </p:cNvPr>
+            <p:cNvGrpSpPr/>
+            <p:nvPr/>
+          </p:nvGrpSpPr>
+          <p:grpSpPr>
+            <a:xfrm>
+              <a:off x="3688198" y="1241773"/>
+              <a:ext cx="523782" cy="774679"/>
+              <a:chOff x="1464816" y="1819922"/>
+              <a:chExt cx="905522" cy="1221915"/>
+            </a:xfrm>
+          </p:grpSpPr>
+          <p:sp>
+            <p:nvSpPr>
+              <p:cNvPr id="5" name="타원 4">
+                <a:extLst>
+                  <a:ext uri="{FF2B5EF4-FFF2-40B4-BE49-F238E27FC236}">
+                    <a16:creationId xmlns:a16="http://schemas.microsoft.com/office/drawing/2014/main" id="{3E5EED01-EF6B-439A-8F24-84DFB6C0C8E3}"/>
+                  </a:ext>
+                </a:extLst>
+              </p:cNvPr>
+              <p:cNvSpPr/>
+              <p:nvPr/>
+            </p:nvSpPr>
+            <p:spPr>
+              <a:xfrm>
+                <a:off x="1651247" y="1819922"/>
+                <a:ext cx="461638" cy="452761"/>
+              </a:xfrm>
+              <a:prstGeom prst="ellipse">
+                <a:avLst/>
+              </a:prstGeom>
+              <a:solidFill>
+                <a:schemeClr val="bg1"/>
+              </a:solidFill>
+              <a:ln w="19050">
+                <a:solidFill>
+                  <a:schemeClr val="tx1"/>
+                </a:solidFill>
+              </a:ln>
+            </p:spPr>
+            <p:style>
+              <a:lnRef idx="2">
+                <a:schemeClr val="accent1">
+                  <a:shade val="50000"/>
+                </a:schemeClr>
+              </a:lnRef>
+              <a:fillRef idx="1">
+                <a:schemeClr val="accent1"/>
+              </a:fillRef>
+              <a:effectRef idx="0">
+                <a:schemeClr val="accent1"/>
+              </a:effectRef>
+              <a:fontRef idx="minor">
+                <a:schemeClr val="lt1"/>
+              </a:fontRef>
+            </p:style>
+            <p:txBody>
+              <a:bodyPr rtlCol="0" anchor="ctr"/>
+              <a:lstStyle/>
+              <a:p>
+                <a:pPr algn="ctr"/>
+                <a:endParaRPr lang="ko-KR" altLang="en-US"/>
+              </a:p>
+            </p:txBody>
+          </p:sp>
+          <p:cxnSp>
+            <p:nvCxnSpPr>
+              <p:cNvPr id="6" name="직선 연결선 5">
+                <a:extLst>
+                  <a:ext uri="{FF2B5EF4-FFF2-40B4-BE49-F238E27FC236}">
+                    <a16:creationId xmlns:a16="http://schemas.microsoft.com/office/drawing/2014/main" id="{374ABE4B-2618-4588-8ACC-C02FC650828F}"/>
+                  </a:ext>
+                </a:extLst>
+              </p:cNvPr>
+              <p:cNvCxnSpPr>
+                <a:cxnSpLocks/>
+                <a:stCxn id="5" idx="4"/>
+              </p:cNvCxnSpPr>
+              <p:nvPr/>
+            </p:nvCxnSpPr>
+            <p:spPr>
+              <a:xfrm>
+                <a:off x="1882065" y="2272683"/>
+                <a:ext cx="0" cy="387415"/>
+              </a:xfrm>
+              <a:prstGeom prst="line">
+                <a:avLst/>
+              </a:prstGeom>
+              <a:ln w="19050">
+                <a:solidFill>
+                  <a:schemeClr val="tx1"/>
+                </a:solidFill>
+              </a:ln>
+            </p:spPr>
+            <p:style>
+              <a:lnRef idx="1">
+                <a:schemeClr val="accent1"/>
+              </a:lnRef>
+              <a:fillRef idx="0">
+                <a:schemeClr val="accent1"/>
+              </a:fillRef>
+              <a:effectRef idx="0">
+                <a:schemeClr val="accent1"/>
+              </a:effectRef>
+              <a:fontRef idx="minor">
+                <a:schemeClr val="tx1"/>
+              </a:fontRef>
+            </p:style>
+          </p:cxnSp>
+          <p:cxnSp>
+            <p:nvCxnSpPr>
+              <p:cNvPr id="7" name="직선 연결선 6">
+                <a:extLst>
+                  <a:ext uri="{FF2B5EF4-FFF2-40B4-BE49-F238E27FC236}">
+                    <a16:creationId xmlns:a16="http://schemas.microsoft.com/office/drawing/2014/main" id="{EF411288-344E-4D20-A90A-7A20F5531829}"/>
+                  </a:ext>
+                </a:extLst>
+              </p:cNvPr>
+              <p:cNvCxnSpPr>
+                <a:cxnSpLocks/>
+              </p:cNvCxnSpPr>
+              <p:nvPr/>
+            </p:nvCxnSpPr>
+            <p:spPr>
+              <a:xfrm>
+                <a:off x="1464816" y="2388093"/>
+                <a:ext cx="905522" cy="0"/>
+              </a:xfrm>
+              <a:prstGeom prst="line">
+                <a:avLst/>
+              </a:prstGeom>
+              <a:ln w="19050">
+                <a:solidFill>
+                  <a:schemeClr val="tx1"/>
+                </a:solidFill>
+              </a:ln>
+            </p:spPr>
+            <p:style>
+              <a:lnRef idx="1">
+                <a:schemeClr val="accent1"/>
+              </a:lnRef>
+              <a:fillRef idx="0">
+                <a:schemeClr val="accent1"/>
+              </a:fillRef>
+              <a:effectRef idx="0">
+                <a:schemeClr val="accent1"/>
+              </a:effectRef>
+              <a:fontRef idx="minor">
+                <a:schemeClr val="tx1"/>
+              </a:fontRef>
+            </p:style>
+          </p:cxnSp>
+          <p:cxnSp>
+            <p:nvCxnSpPr>
+              <p:cNvPr id="8" name="직선 연결선 7">
+                <a:extLst>
+                  <a:ext uri="{FF2B5EF4-FFF2-40B4-BE49-F238E27FC236}">
+                    <a16:creationId xmlns:a16="http://schemas.microsoft.com/office/drawing/2014/main" id="{13C4B470-D12F-458C-86BD-ACF4C908603A}"/>
+                  </a:ext>
+                </a:extLst>
+              </p:cNvPr>
+              <p:cNvCxnSpPr>
+                <a:cxnSpLocks/>
+              </p:cNvCxnSpPr>
+              <p:nvPr/>
+            </p:nvCxnSpPr>
+            <p:spPr>
+              <a:xfrm flipH="1">
+                <a:off x="1535836" y="2660098"/>
+                <a:ext cx="346230" cy="381739"/>
+              </a:xfrm>
+              <a:prstGeom prst="line">
+                <a:avLst/>
+              </a:prstGeom>
+              <a:ln w="19050">
+                <a:solidFill>
+                  <a:schemeClr val="tx1"/>
+                </a:solidFill>
+              </a:ln>
+            </p:spPr>
+            <p:style>
+              <a:lnRef idx="1">
+                <a:schemeClr val="accent1"/>
+              </a:lnRef>
+              <a:fillRef idx="0">
+                <a:schemeClr val="accent1"/>
+              </a:fillRef>
+              <a:effectRef idx="0">
+                <a:schemeClr val="accent1"/>
+              </a:effectRef>
+              <a:fontRef idx="minor">
+                <a:schemeClr val="tx1"/>
+              </a:fontRef>
+            </p:style>
+          </p:cxnSp>
+          <p:cxnSp>
+            <p:nvCxnSpPr>
+              <p:cNvPr id="9" name="직선 연결선 8">
+                <a:extLst>
+                  <a:ext uri="{FF2B5EF4-FFF2-40B4-BE49-F238E27FC236}">
+                    <a16:creationId xmlns:a16="http://schemas.microsoft.com/office/drawing/2014/main" id="{27E11627-BDE9-47C1-94BF-41EDF8DF5E6C}"/>
+                  </a:ext>
+                </a:extLst>
+              </p:cNvPr>
+              <p:cNvCxnSpPr>
+                <a:cxnSpLocks/>
+              </p:cNvCxnSpPr>
+              <p:nvPr/>
+            </p:nvCxnSpPr>
+            <p:spPr>
+              <a:xfrm>
+                <a:off x="1869424" y="2660098"/>
+                <a:ext cx="355107" cy="381739"/>
+              </a:xfrm>
+              <a:prstGeom prst="line">
+                <a:avLst/>
+              </a:prstGeom>
+              <a:ln w="19050">
+                <a:solidFill>
+                  <a:schemeClr val="tx1"/>
+                </a:solidFill>
+              </a:ln>
+            </p:spPr>
+            <p:style>
+              <a:lnRef idx="1">
+                <a:schemeClr val="accent1"/>
+              </a:lnRef>
+              <a:fillRef idx="0">
+                <a:schemeClr val="accent1"/>
+              </a:fillRef>
+              <a:effectRef idx="0">
+                <a:schemeClr val="accent1"/>
+              </a:effectRef>
+              <a:fontRef idx="minor">
+                <a:schemeClr val="tx1"/>
+              </a:fontRef>
+            </p:style>
+          </p:cxnSp>
+        </p:grpSp>
+        <p:cxnSp>
+          <p:nvCxnSpPr>
+            <p:cNvPr id="11" name="직선 연결선 10">
+              <a:extLst>
+                <a:ext uri="{FF2B5EF4-FFF2-40B4-BE49-F238E27FC236}">
+                  <a16:creationId xmlns:a16="http://schemas.microsoft.com/office/drawing/2014/main" id="{4E459D5A-39BA-47F7-BC6F-E8F560FFD061}"/>
+                </a:ext>
+              </a:extLst>
+            </p:cNvPr>
+            <p:cNvCxnSpPr>
+              <a:cxnSpLocks/>
+              <a:stCxn id="13" idx="2"/>
+            </p:cNvCxnSpPr>
+            <p:nvPr/>
+          </p:nvCxnSpPr>
+          <p:spPr>
+            <a:xfrm>
+              <a:off x="3922238" y="2673222"/>
+              <a:ext cx="0" cy="3834110"/>
+            </a:xfrm>
+            <a:prstGeom prst="line">
+              <a:avLst/>
+            </a:prstGeom>
+            <a:ln w="19050">
+              <a:solidFill>
+                <a:schemeClr val="tx1"/>
+              </a:solidFill>
+              <a:prstDash val="dash"/>
+            </a:ln>
+          </p:spPr>
+          <p:style>
+            <a:lnRef idx="1">
+              <a:schemeClr val="accent1"/>
+            </a:lnRef>
+            <a:fillRef idx="0">
+              <a:schemeClr val="accent1"/>
+            </a:fillRef>
+            <a:effectRef idx="0">
+              <a:schemeClr val="accent1"/>
+            </a:effectRef>
+            <a:fontRef idx="minor">
+              <a:schemeClr val="tx1"/>
+            </a:fontRef>
+          </p:style>
+        </p:cxnSp>
+        <p:sp>
+          <p:nvSpPr>
+            <p:cNvPr id="13" name="직사각형 12">
+              <a:extLst>
+                <a:ext uri="{FF2B5EF4-FFF2-40B4-BE49-F238E27FC236}">
+                  <a16:creationId xmlns:a16="http://schemas.microsoft.com/office/drawing/2014/main" id="{F2C88345-39BF-48B5-B3FF-4F9E8699D0AF}"/>
+                </a:ext>
+              </a:extLst>
+            </p:cNvPr>
+            <p:cNvSpPr/>
+            <p:nvPr/>
+          </p:nvSpPr>
+          <p:spPr>
+            <a:xfrm>
+              <a:off x="3222367" y="2026891"/>
+              <a:ext cx="1399742" cy="646331"/>
+            </a:xfrm>
+            <a:prstGeom prst="rect">
+              <a:avLst/>
+            </a:prstGeom>
+          </p:spPr>
+          <p:txBody>
+            <a:bodyPr wrap="none">
+              <a:spAutoFit/>
+            </a:bodyPr>
+            <a:lstStyle/>
+            <a:p>
+              <a:pPr algn="ctr"/>
+              <a:r>
+                <a:rPr lang="en-US" altLang="ko-KR" dirty="0" err="1"/>
+                <a:t>Eable</a:t>
+              </a:r>
+              <a:r>
+                <a:rPr lang="ko-KR" altLang="en-US" dirty="0"/>
+                <a:t> </a:t>
+              </a:r>
+              <a:r>
+                <a:rPr lang="en-US" altLang="ko-KR" dirty="0"/>
+                <a:t>Login</a:t>
+              </a:r>
+            </a:p>
+            <a:p>
+              <a:pPr algn="ctr"/>
+              <a:r>
+                <a:rPr lang="en-US" altLang="ko-KR" dirty="0"/>
+                <a:t>user</a:t>
+              </a:r>
+              <a:endParaRPr lang="ko-KR" altLang="en-US" dirty="0"/>
+            </a:p>
+          </p:txBody>
+        </p:sp>
+        <p:sp>
+          <p:nvSpPr>
+            <p:cNvPr id="15" name="직사각형 14">
+              <a:extLst>
+                <a:ext uri="{FF2B5EF4-FFF2-40B4-BE49-F238E27FC236}">
+                  <a16:creationId xmlns:a16="http://schemas.microsoft.com/office/drawing/2014/main" id="{F57D0D23-C896-41BA-B3B9-D8A181837538}"/>
+                </a:ext>
+              </a:extLst>
+            </p:cNvPr>
+            <p:cNvSpPr/>
+            <p:nvPr/>
+          </p:nvSpPr>
+          <p:spPr>
+            <a:xfrm>
+              <a:off x="3826586" y="2807414"/>
+              <a:ext cx="204448" cy="3447082"/>
+            </a:xfrm>
+            <a:prstGeom prst="rect">
+              <a:avLst/>
+            </a:prstGeom>
+            <a:solidFill>
+              <a:schemeClr val="bg1"/>
+            </a:solidFill>
+            <a:ln w="12700">
+              <a:solidFill>
+                <a:schemeClr val="tx1"/>
+              </a:solidFill>
+            </a:ln>
+          </p:spPr>
+          <p:style>
+            <a:lnRef idx="2">
+              <a:schemeClr val="accent1">
+                <a:shade val="50000"/>
+              </a:schemeClr>
+            </a:lnRef>
+            <a:fillRef idx="1">
+              <a:schemeClr val="accent1"/>
+            </a:fillRef>
+            <a:effectRef idx="0">
+              <a:schemeClr val="accent1"/>
+            </a:effectRef>
+            <a:fontRef idx="minor">
+              <a:schemeClr val="lt1"/>
+            </a:fontRef>
+          </p:style>
+          <p:txBody>
+            <a:bodyPr rtlCol="0" anchor="ctr"/>
+            <a:lstStyle/>
+            <a:p>
+              <a:pPr algn="ctr"/>
+              <a:endParaRPr lang="ko-KR" altLang="en-US"/>
+            </a:p>
+          </p:txBody>
+        </p:sp>
+        <p:cxnSp>
+          <p:nvCxnSpPr>
+            <p:cNvPr id="16" name="직선 연결선 15">
+              <a:extLst>
+                <a:ext uri="{FF2B5EF4-FFF2-40B4-BE49-F238E27FC236}">
+                  <a16:creationId xmlns:a16="http://schemas.microsoft.com/office/drawing/2014/main" id="{4C87BBC2-28AC-4356-8C23-9CF6745BDAB0}"/>
+                </a:ext>
+              </a:extLst>
+            </p:cNvPr>
+            <p:cNvCxnSpPr>
+              <a:cxnSpLocks/>
+            </p:cNvCxnSpPr>
+            <p:nvPr/>
+          </p:nvCxnSpPr>
+          <p:spPr>
+            <a:xfrm flipH="1">
+              <a:off x="6646075" y="2036402"/>
+              <a:ext cx="9347" cy="4470930"/>
+            </a:xfrm>
+            <a:prstGeom prst="line">
+              <a:avLst/>
+            </a:prstGeom>
+            <a:ln w="19050">
+              <a:solidFill>
+                <a:schemeClr val="tx1"/>
+              </a:solidFill>
+              <a:prstDash val="dash"/>
+            </a:ln>
+          </p:spPr>
+          <p:style>
+            <a:lnRef idx="1">
+              <a:schemeClr val="accent1"/>
+            </a:lnRef>
+            <a:fillRef idx="0">
+              <a:schemeClr val="accent1"/>
+            </a:fillRef>
+            <a:effectRef idx="0">
+              <a:schemeClr val="accent1"/>
+            </a:effectRef>
+            <a:fontRef idx="minor">
+              <a:schemeClr val="tx1"/>
+            </a:fontRef>
+          </p:style>
+        </p:cxnSp>
+        <p:cxnSp>
+          <p:nvCxnSpPr>
+            <p:cNvPr id="18" name="직선 화살표 연결선 17">
+              <a:extLst>
+                <a:ext uri="{FF2B5EF4-FFF2-40B4-BE49-F238E27FC236}">
+                  <a16:creationId xmlns:a16="http://schemas.microsoft.com/office/drawing/2014/main" id="{F634B7B2-C30E-432B-AD79-F04414B3217B}"/>
+                </a:ext>
+              </a:extLst>
+            </p:cNvPr>
+            <p:cNvCxnSpPr>
+              <a:cxnSpLocks/>
+              <a:stCxn id="15" idx="0"/>
+            </p:cNvCxnSpPr>
+            <p:nvPr/>
+          </p:nvCxnSpPr>
+          <p:spPr>
+            <a:xfrm>
+              <a:off x="3928810" y="2807414"/>
+              <a:ext cx="2717024" cy="0"/>
+            </a:xfrm>
+            <a:prstGeom prst="straightConnector1">
+              <a:avLst/>
+            </a:prstGeom>
+            <a:ln w="12700">
+              <a:solidFill>
+                <a:schemeClr val="tx1"/>
+              </a:solidFill>
+              <a:tailEnd type="triangle"/>
+            </a:ln>
+          </p:spPr>
+          <p:style>
+            <a:lnRef idx="1">
+              <a:schemeClr val="accent1"/>
+            </a:lnRef>
+            <a:fillRef idx="0">
+              <a:schemeClr val="accent1"/>
+            </a:fillRef>
+            <a:effectRef idx="0">
+              <a:schemeClr val="accent1"/>
+            </a:effectRef>
+            <a:fontRef idx="minor">
+              <a:schemeClr val="tx1"/>
+            </a:fontRef>
+          </p:style>
+        </p:cxnSp>
+        <p:sp>
+          <p:nvSpPr>
+            <p:cNvPr id="20" name="TextBox 19">
+              <a:extLst>
+                <a:ext uri="{FF2B5EF4-FFF2-40B4-BE49-F238E27FC236}">
+                  <a16:creationId xmlns:a16="http://schemas.microsoft.com/office/drawing/2014/main" id="{C475DB69-6326-480D-8BE8-79D561C7C0E0}"/>
+                </a:ext>
+              </a:extLst>
+            </p:cNvPr>
+            <p:cNvSpPr txBox="1"/>
+            <p:nvPr/>
+          </p:nvSpPr>
+          <p:spPr>
+            <a:xfrm>
+              <a:off x="4106538" y="2460470"/>
+              <a:ext cx="1588579" cy="307777"/>
+            </a:xfrm>
+            <a:prstGeom prst="rect">
+              <a:avLst/>
+            </a:prstGeom>
+            <a:noFill/>
+          </p:spPr>
+          <p:txBody>
+            <a:bodyPr wrap="square" rtlCol="0">
+              <a:spAutoFit/>
+            </a:bodyPr>
+            <a:lstStyle/>
+            <a:p>
+              <a:r>
+                <a:rPr lang="en-US" altLang="ko-KR" sz="1400" dirty="0"/>
+                <a:t>Input(</a:t>
+              </a:r>
+              <a:r>
+                <a:rPr lang="en-US" altLang="ko-KR" sz="1400" dirty="0" err="1"/>
+                <a:t>sMsg</a:t>
+              </a:r>
+              <a:r>
+                <a:rPr lang="en-US" altLang="ko-KR" sz="1400" dirty="0"/>
+                <a:t>)</a:t>
+              </a:r>
+              <a:endParaRPr lang="ko-KR" altLang="en-US" sz="1400" dirty="0"/>
+            </a:p>
+          </p:txBody>
+        </p:sp>
+        <p:sp>
+          <p:nvSpPr>
+            <p:cNvPr id="26" name="직사각형 25">
+              <a:extLst>
+                <a:ext uri="{FF2B5EF4-FFF2-40B4-BE49-F238E27FC236}">
+                  <a16:creationId xmlns:a16="http://schemas.microsoft.com/office/drawing/2014/main" id="{37707C7B-8689-4A55-BF13-9381B14E42AC}"/>
+                </a:ext>
+              </a:extLst>
+            </p:cNvPr>
+            <p:cNvSpPr/>
+            <p:nvPr/>
+          </p:nvSpPr>
+          <p:spPr>
+            <a:xfrm>
+              <a:off x="5600354" y="1581548"/>
+              <a:ext cx="2110133" cy="424890"/>
+            </a:xfrm>
+            <a:prstGeom prst="rect">
+              <a:avLst/>
+            </a:prstGeom>
+            <a:solidFill>
+              <a:schemeClr val="bg1"/>
+            </a:solidFill>
+            <a:ln>
+              <a:solidFill>
+                <a:schemeClr val="tx1"/>
+              </a:solidFill>
+            </a:ln>
+            <a:effectLst>
+              <a:outerShdw blurRad="50800" dist="38100" dir="2700000" algn="tl" rotWithShape="0">
+                <a:prstClr val="black">
+                  <a:alpha val="40000"/>
+                </a:prstClr>
+              </a:outerShdw>
+            </a:effectLst>
+          </p:spPr>
+          <p:style>
+            <a:lnRef idx="2">
+              <a:schemeClr val="accent1">
+                <a:shade val="50000"/>
+              </a:schemeClr>
+            </a:lnRef>
+            <a:fillRef idx="1">
+              <a:schemeClr val="accent1"/>
+            </a:fillRef>
+            <a:effectRef idx="0">
+              <a:schemeClr val="accent1"/>
+            </a:effectRef>
+            <a:fontRef idx="minor">
+              <a:schemeClr val="lt1"/>
+            </a:fontRef>
+          </p:style>
+          <p:txBody>
+            <a:bodyPr rtlCol="0" anchor="ctr"/>
+            <a:lstStyle/>
+            <a:p>
+              <a:pPr algn="ctr"/>
+              <a:r>
+                <a:rPr lang="en-US" altLang="ko-KR" dirty="0">
+                  <a:solidFill>
+                    <a:schemeClr val="tx1"/>
+                  </a:solidFill>
+                </a:rPr>
+                <a:t>:</a:t>
+              </a:r>
+              <a:r>
+                <a:rPr lang="en-US" altLang="ko-KR" dirty="0" err="1">
+                  <a:solidFill>
+                    <a:schemeClr val="tx1"/>
+                  </a:solidFill>
+                </a:rPr>
+                <a:t>Handle_Read</a:t>
+              </a:r>
+              <a:endParaRPr lang="ko-KR" altLang="en-US" dirty="0">
+                <a:solidFill>
+                  <a:schemeClr val="tx1"/>
+                </a:solidFill>
+              </a:endParaRPr>
+            </a:p>
+          </p:txBody>
+        </p:sp>
+        <p:sp>
+          <p:nvSpPr>
+            <p:cNvPr id="27" name="직사각형 26">
+              <a:extLst>
+                <a:ext uri="{FF2B5EF4-FFF2-40B4-BE49-F238E27FC236}">
+                  <a16:creationId xmlns:a16="http://schemas.microsoft.com/office/drawing/2014/main" id="{5D60EB65-DFCD-4617-B951-758F2308CD6B}"/>
+                </a:ext>
+              </a:extLst>
+            </p:cNvPr>
+            <p:cNvSpPr/>
+            <p:nvPr/>
+          </p:nvSpPr>
+          <p:spPr>
+            <a:xfrm>
+              <a:off x="8940494" y="1581345"/>
+              <a:ext cx="2193165" cy="424890"/>
+            </a:xfrm>
+            <a:prstGeom prst="rect">
+              <a:avLst/>
+            </a:prstGeom>
+            <a:solidFill>
+              <a:schemeClr val="bg1"/>
+            </a:solidFill>
+            <a:ln>
+              <a:solidFill>
+                <a:schemeClr val="tx1"/>
+              </a:solidFill>
+            </a:ln>
+            <a:effectLst>
+              <a:outerShdw blurRad="50800" dist="38100" dir="2700000" algn="tl" rotWithShape="0">
+                <a:prstClr val="black">
+                  <a:alpha val="40000"/>
+                </a:prstClr>
+              </a:outerShdw>
+            </a:effectLst>
+          </p:spPr>
+          <p:style>
+            <a:lnRef idx="2">
+              <a:schemeClr val="accent1">
+                <a:shade val="50000"/>
+              </a:schemeClr>
+            </a:lnRef>
+            <a:fillRef idx="1">
+              <a:schemeClr val="accent1"/>
+            </a:fillRef>
+            <a:effectRef idx="0">
+              <a:schemeClr val="accent1"/>
+            </a:effectRef>
+            <a:fontRef idx="minor">
+              <a:schemeClr val="lt1"/>
+            </a:fontRef>
+          </p:style>
+          <p:txBody>
+            <a:bodyPr rtlCol="0" anchor="ctr"/>
+            <a:lstStyle/>
+            <a:p>
+              <a:pPr algn="ctr"/>
+              <a:r>
+                <a:rPr lang="en-US" altLang="ko-KR" dirty="0" err="1">
+                  <a:solidFill>
+                    <a:schemeClr val="tx1"/>
+                  </a:solidFill>
+                </a:rPr>
+                <a:t>asUser_Current:List</a:t>
+              </a:r>
+              <a:endParaRPr lang="ko-KR" altLang="en-US" dirty="0">
+                <a:solidFill>
+                  <a:schemeClr val="tx1"/>
+                </a:solidFill>
+              </a:endParaRPr>
+            </a:p>
+          </p:txBody>
+        </p:sp>
+        <p:cxnSp>
+          <p:nvCxnSpPr>
+            <p:cNvPr id="28" name="직선 연결선 27">
+              <a:extLst>
+                <a:ext uri="{FF2B5EF4-FFF2-40B4-BE49-F238E27FC236}">
+                  <a16:creationId xmlns:a16="http://schemas.microsoft.com/office/drawing/2014/main" id="{2D2BE1B7-D96B-4F07-97F7-FC8A78168622}"/>
+                </a:ext>
+              </a:extLst>
+            </p:cNvPr>
+            <p:cNvCxnSpPr>
+              <a:cxnSpLocks/>
+            </p:cNvCxnSpPr>
+            <p:nvPr/>
+          </p:nvCxnSpPr>
+          <p:spPr>
+            <a:xfrm>
+              <a:off x="10039263" y="2034622"/>
+              <a:ext cx="0" cy="4472710"/>
+            </a:xfrm>
+            <a:prstGeom prst="line">
+              <a:avLst/>
+            </a:prstGeom>
+            <a:ln w="19050">
+              <a:solidFill>
+                <a:schemeClr val="tx1"/>
+              </a:solidFill>
+              <a:prstDash val="dash"/>
+            </a:ln>
+          </p:spPr>
+          <p:style>
+            <a:lnRef idx="1">
+              <a:schemeClr val="accent1"/>
+            </a:lnRef>
+            <a:fillRef idx="0">
+              <a:schemeClr val="accent1"/>
+            </a:fillRef>
+            <a:effectRef idx="0">
+              <a:schemeClr val="accent1"/>
+            </a:effectRef>
+            <a:fontRef idx="minor">
+              <a:schemeClr val="tx1"/>
+            </a:fontRef>
+          </p:style>
+        </p:cxnSp>
+        <p:cxnSp>
+          <p:nvCxnSpPr>
+            <p:cNvPr id="32" name="직선 화살표 연결선 31">
+              <a:extLst>
+                <a:ext uri="{FF2B5EF4-FFF2-40B4-BE49-F238E27FC236}">
+                  <a16:creationId xmlns:a16="http://schemas.microsoft.com/office/drawing/2014/main" id="{9C1B19F5-6816-4890-A013-8FF623010177}"/>
+                </a:ext>
+              </a:extLst>
+            </p:cNvPr>
+            <p:cNvCxnSpPr>
+              <a:cxnSpLocks/>
+            </p:cNvCxnSpPr>
+            <p:nvPr/>
+          </p:nvCxnSpPr>
+          <p:spPr>
+            <a:xfrm>
+              <a:off x="6657464" y="3130764"/>
+              <a:ext cx="3272186" cy="0"/>
+            </a:xfrm>
+            <a:prstGeom prst="straightConnector1">
+              <a:avLst/>
+            </a:prstGeom>
+            <a:ln w="12700">
+              <a:solidFill>
+                <a:schemeClr val="tx1"/>
+              </a:solidFill>
+              <a:tailEnd type="triangle"/>
+            </a:ln>
+          </p:spPr>
+          <p:style>
+            <a:lnRef idx="1">
+              <a:schemeClr val="accent1"/>
+            </a:lnRef>
+            <a:fillRef idx="0">
+              <a:schemeClr val="accent1"/>
+            </a:fillRef>
+            <a:effectRef idx="0">
+              <a:schemeClr val="accent1"/>
+            </a:effectRef>
+            <a:fontRef idx="minor">
+              <a:schemeClr val="tx1"/>
+            </a:fontRef>
+          </p:style>
+        </p:cxnSp>
+        <p:sp>
+          <p:nvSpPr>
+            <p:cNvPr id="34" name="TextBox 33">
+              <a:extLst>
+                <a:ext uri="{FF2B5EF4-FFF2-40B4-BE49-F238E27FC236}">
+                  <a16:creationId xmlns:a16="http://schemas.microsoft.com/office/drawing/2014/main" id="{BB06CE93-D249-4CCF-AA17-1B75AFEE4245}"/>
+                </a:ext>
+              </a:extLst>
+            </p:cNvPr>
+            <p:cNvSpPr txBox="1"/>
+            <p:nvPr/>
+          </p:nvSpPr>
+          <p:spPr>
+            <a:xfrm>
+              <a:off x="7206369" y="2803548"/>
+              <a:ext cx="2708792" cy="307777"/>
+            </a:xfrm>
+            <a:prstGeom prst="rect">
+              <a:avLst/>
+            </a:prstGeom>
+            <a:noFill/>
+          </p:spPr>
+          <p:txBody>
+            <a:bodyPr wrap="square" rtlCol="0">
+              <a:spAutoFit/>
+            </a:bodyPr>
+            <a:lstStyle/>
+            <a:p>
+              <a:r>
+                <a:rPr lang="en-US" altLang="ko-KR" sz="1400" dirty="0" err="1"/>
+                <a:t>WhoIsVenID</a:t>
+              </a:r>
+              <a:r>
+                <a:rPr lang="en-US" altLang="ko-KR" sz="1400" dirty="0"/>
+                <a:t>?(</a:t>
+              </a:r>
+              <a:r>
+                <a:rPr lang="en-US" altLang="ko-KR" sz="1400" dirty="0" err="1"/>
+                <a:t>nClnt_Sock</a:t>
+              </a:r>
+              <a:r>
+                <a:rPr lang="en-US" altLang="ko-KR" sz="1400" dirty="0"/>
+                <a:t>)</a:t>
+              </a:r>
+              <a:endParaRPr lang="ko-KR" altLang="en-US" sz="1400" dirty="0"/>
+            </a:p>
+          </p:txBody>
+        </p:sp>
+        <p:sp>
+          <p:nvSpPr>
+            <p:cNvPr id="46" name="직사각형 45">
+              <a:extLst>
+                <a:ext uri="{FF2B5EF4-FFF2-40B4-BE49-F238E27FC236}">
+                  <a16:creationId xmlns:a16="http://schemas.microsoft.com/office/drawing/2014/main" id="{4A22138D-67B5-4910-A51A-F2A766955BDB}"/>
+                </a:ext>
+              </a:extLst>
+            </p:cNvPr>
+            <p:cNvSpPr/>
+            <p:nvPr/>
+          </p:nvSpPr>
+          <p:spPr>
+            <a:xfrm>
+              <a:off x="9944376" y="2807414"/>
+              <a:ext cx="199693" cy="3447081"/>
+            </a:xfrm>
+            <a:prstGeom prst="rect">
+              <a:avLst/>
+            </a:prstGeom>
+            <a:solidFill>
+              <a:schemeClr val="bg1"/>
+            </a:solidFill>
+            <a:ln w="12700">
+              <a:solidFill>
+                <a:schemeClr val="tx1"/>
+              </a:solidFill>
+            </a:ln>
+          </p:spPr>
+          <p:style>
+            <a:lnRef idx="2">
+              <a:schemeClr val="accent1">
+                <a:shade val="50000"/>
+              </a:schemeClr>
+            </a:lnRef>
+            <a:fillRef idx="1">
+              <a:schemeClr val="accent1"/>
+            </a:fillRef>
+            <a:effectRef idx="0">
+              <a:schemeClr val="accent1"/>
+            </a:effectRef>
+            <a:fontRef idx="minor">
+              <a:schemeClr val="lt1"/>
+            </a:fontRef>
+          </p:style>
+          <p:txBody>
+            <a:bodyPr rtlCol="0" anchor="ctr"/>
+            <a:lstStyle/>
+            <a:p>
+              <a:pPr algn="ctr"/>
+              <a:endParaRPr lang="ko-KR" altLang="en-US"/>
+            </a:p>
+          </p:txBody>
+        </p:sp>
+        <p:sp>
+          <p:nvSpPr>
+            <p:cNvPr id="50" name="직사각형 49">
+              <a:extLst>
+                <a:ext uri="{FF2B5EF4-FFF2-40B4-BE49-F238E27FC236}">
+                  <a16:creationId xmlns:a16="http://schemas.microsoft.com/office/drawing/2014/main" id="{8431707E-B9CD-413C-97CC-76A7A9D1EF47}"/>
+                </a:ext>
+              </a:extLst>
+            </p:cNvPr>
+            <p:cNvSpPr/>
+            <p:nvPr/>
+          </p:nvSpPr>
+          <p:spPr>
+            <a:xfrm>
+              <a:off x="559145" y="460321"/>
+              <a:ext cx="2541302" cy="369332"/>
+            </a:xfrm>
+            <a:prstGeom prst="rect">
+              <a:avLst/>
+            </a:prstGeom>
+          </p:spPr>
+          <p:txBody>
+            <a:bodyPr wrap="square">
+              <a:spAutoFit/>
+            </a:bodyPr>
+            <a:lstStyle/>
+            <a:p>
+              <a:pPr algn="ctr"/>
+              <a:r>
+                <a:rPr lang="en-US" altLang="ko-KR" dirty="0"/>
+                <a:t>&lt; </a:t>
+              </a:r>
+              <a:r>
+                <a:rPr lang="en-US" altLang="ko-KR" dirty="0" err="1"/>
+                <a:t>Eable</a:t>
+              </a:r>
+              <a:r>
+                <a:rPr lang="en-US" altLang="ko-KR" dirty="0"/>
+                <a:t> Login User &gt;</a:t>
+              </a:r>
+              <a:endParaRPr lang="ko-KR" altLang="en-US" dirty="0"/>
+            </a:p>
+          </p:txBody>
+        </p:sp>
+        <p:sp>
+          <p:nvSpPr>
+            <p:cNvPr id="33" name="직사각형 32">
+              <a:extLst>
+                <a:ext uri="{FF2B5EF4-FFF2-40B4-BE49-F238E27FC236}">
+                  <a16:creationId xmlns:a16="http://schemas.microsoft.com/office/drawing/2014/main" id="{D4C68DA1-4138-48DA-AC66-D9E215F54CC6}"/>
+                </a:ext>
+              </a:extLst>
+            </p:cNvPr>
+            <p:cNvSpPr/>
+            <p:nvPr/>
+          </p:nvSpPr>
+          <p:spPr>
+            <a:xfrm>
+              <a:off x="1931805" y="3492609"/>
+              <a:ext cx="2048702" cy="276999"/>
+            </a:xfrm>
+            <a:prstGeom prst="rect">
+              <a:avLst/>
+            </a:prstGeom>
+          </p:spPr>
+          <p:txBody>
+            <a:bodyPr wrap="none">
+              <a:spAutoFit/>
+            </a:bodyPr>
+            <a:lstStyle/>
+            <a:p>
+              <a:r>
+                <a:rPr lang="en-US" altLang="ko-KR" sz="1200" b="1" dirty="0"/>
+                <a:t>[</a:t>
+              </a:r>
+              <a:r>
+                <a:rPr lang="en-US" altLang="ko-KR" sz="1200" b="1" dirty="0" err="1"/>
+                <a:t>sendTrue</a:t>
+              </a:r>
+              <a:r>
+                <a:rPr lang="en-US" altLang="ko-KR" sz="1200" b="1" dirty="0"/>
+                <a:t> = FLAG_FALSE]</a:t>
+              </a:r>
+              <a:endParaRPr lang="ko-KR" altLang="en-US" sz="1200" b="1" dirty="0"/>
+            </a:p>
+          </p:txBody>
+        </p:sp>
+        <p:cxnSp>
+          <p:nvCxnSpPr>
+            <p:cNvPr id="35" name="직선 화살표 연결선 34">
+              <a:extLst>
+                <a:ext uri="{FF2B5EF4-FFF2-40B4-BE49-F238E27FC236}">
+                  <a16:creationId xmlns:a16="http://schemas.microsoft.com/office/drawing/2014/main" id="{C1E23A14-F96B-4998-AB57-AE10AC4AB298}"/>
+                </a:ext>
+              </a:extLst>
+            </p:cNvPr>
+            <p:cNvCxnSpPr>
+              <a:cxnSpLocks/>
+            </p:cNvCxnSpPr>
+            <p:nvPr/>
+          </p:nvCxnSpPr>
+          <p:spPr>
+            <a:xfrm flipH="1">
+              <a:off x="6655421" y="4034124"/>
+              <a:ext cx="3288955" cy="0"/>
+            </a:xfrm>
+            <a:prstGeom prst="straightConnector1">
+              <a:avLst/>
+            </a:prstGeom>
+            <a:ln w="12700">
+              <a:solidFill>
+                <a:schemeClr val="tx1"/>
+              </a:solidFill>
+              <a:prstDash val="dash"/>
+              <a:tailEnd type="triangle"/>
+            </a:ln>
+          </p:spPr>
+          <p:style>
+            <a:lnRef idx="1">
+              <a:schemeClr val="accent1"/>
+            </a:lnRef>
+            <a:fillRef idx="0">
+              <a:schemeClr val="accent1"/>
+            </a:fillRef>
+            <a:effectRef idx="0">
+              <a:schemeClr val="accent1"/>
+            </a:effectRef>
+            <a:fontRef idx="minor">
+              <a:schemeClr val="tx1"/>
+            </a:fontRef>
+          </p:style>
+        </p:cxnSp>
+        <p:sp>
+          <p:nvSpPr>
+            <p:cNvPr id="36" name="TextBox 35">
+              <a:extLst>
+                <a:ext uri="{FF2B5EF4-FFF2-40B4-BE49-F238E27FC236}">
+                  <a16:creationId xmlns:a16="http://schemas.microsoft.com/office/drawing/2014/main" id="{A5DDACE6-4C03-48D9-AC21-F78A71985B14}"/>
+                </a:ext>
+              </a:extLst>
+            </p:cNvPr>
+            <p:cNvSpPr txBox="1"/>
+            <p:nvPr/>
+          </p:nvSpPr>
+          <p:spPr>
+            <a:xfrm>
+              <a:off x="8040242" y="3705904"/>
+              <a:ext cx="711060" cy="307777"/>
+            </a:xfrm>
+            <a:prstGeom prst="rect">
+              <a:avLst/>
+            </a:prstGeom>
+            <a:noFill/>
+          </p:spPr>
+          <p:txBody>
+            <a:bodyPr wrap="square" rtlCol="0">
+              <a:spAutoFit/>
+            </a:bodyPr>
+            <a:lstStyle/>
+            <a:p>
+              <a:r>
+                <a:rPr lang="en-US" altLang="ko-KR" sz="1400" dirty="0" err="1"/>
+                <a:t>VanID</a:t>
+              </a:r>
+              <a:r>
+                <a:rPr lang="en-US" altLang="ko-KR" sz="1400" dirty="0"/>
+                <a:t>()</a:t>
+              </a:r>
+              <a:endParaRPr lang="ko-KR" altLang="en-US" sz="1400" dirty="0"/>
+            </a:p>
+          </p:txBody>
+        </p:sp>
+        <p:sp>
+          <p:nvSpPr>
+            <p:cNvPr id="45" name="TextBox 44">
+              <a:extLst>
+                <a:ext uri="{FF2B5EF4-FFF2-40B4-BE49-F238E27FC236}">
+                  <a16:creationId xmlns:a16="http://schemas.microsoft.com/office/drawing/2014/main" id="{9D105098-5F40-456C-9184-E8EC70E22D33}"/>
+                </a:ext>
+              </a:extLst>
+            </p:cNvPr>
+            <p:cNvSpPr txBox="1"/>
+            <p:nvPr/>
+          </p:nvSpPr>
+          <p:spPr>
+            <a:xfrm>
+              <a:off x="7254103" y="4609482"/>
+              <a:ext cx="2247357" cy="307777"/>
+            </a:xfrm>
+            <a:prstGeom prst="rect">
+              <a:avLst/>
+            </a:prstGeom>
+            <a:noFill/>
+          </p:spPr>
+          <p:txBody>
+            <a:bodyPr wrap="square" rtlCol="0">
+              <a:spAutoFit/>
+            </a:bodyPr>
+            <a:lstStyle/>
+            <a:p>
+              <a:r>
+                <a:rPr lang="en-US" altLang="ko-KR" sz="1400" dirty="0" err="1"/>
+                <a:t>DoesLogin</a:t>
+              </a:r>
+              <a:r>
+                <a:rPr lang="en-US" altLang="ko-KR" sz="1400" dirty="0"/>
+                <a:t>?(</a:t>
+              </a:r>
+              <a:r>
+                <a:rPr lang="en-US" altLang="ko-KR" sz="1400" dirty="0" err="1"/>
+                <a:t>nClnt_Sock</a:t>
+              </a:r>
+              <a:r>
+                <a:rPr lang="en-US" altLang="ko-KR" sz="1400" dirty="0"/>
+                <a:t>)</a:t>
+              </a:r>
+              <a:endParaRPr lang="ko-KR" altLang="en-US" sz="1400" dirty="0"/>
+            </a:p>
+          </p:txBody>
+        </p:sp>
+        <p:grpSp>
+          <p:nvGrpSpPr>
+            <p:cNvPr id="47" name="그룹 46">
+              <a:extLst>
+                <a:ext uri="{FF2B5EF4-FFF2-40B4-BE49-F238E27FC236}">
+                  <a16:creationId xmlns:a16="http://schemas.microsoft.com/office/drawing/2014/main" id="{6CF057A6-104C-4EAC-8C88-EDE1A5BF2D55}"/>
+                </a:ext>
+              </a:extLst>
+            </p:cNvPr>
+            <p:cNvGrpSpPr/>
+            <p:nvPr/>
+          </p:nvGrpSpPr>
+          <p:grpSpPr>
+            <a:xfrm>
+              <a:off x="1409132" y="1241773"/>
+              <a:ext cx="523782" cy="774679"/>
+              <a:chOff x="1464816" y="1819922"/>
+              <a:chExt cx="905522" cy="1221915"/>
+            </a:xfrm>
+          </p:grpSpPr>
+          <p:sp>
+            <p:nvSpPr>
+              <p:cNvPr id="48" name="타원 47">
+                <a:extLst>
+                  <a:ext uri="{FF2B5EF4-FFF2-40B4-BE49-F238E27FC236}">
+                    <a16:creationId xmlns:a16="http://schemas.microsoft.com/office/drawing/2014/main" id="{3B865A86-6B60-4A0F-B9BA-6A4A0B495453}"/>
+                  </a:ext>
+                </a:extLst>
+              </p:cNvPr>
+              <p:cNvSpPr/>
+              <p:nvPr/>
+            </p:nvSpPr>
+            <p:spPr>
+              <a:xfrm>
+                <a:off x="1651247" y="1819922"/>
+                <a:ext cx="461638" cy="452761"/>
+              </a:xfrm>
+              <a:prstGeom prst="ellipse">
+                <a:avLst/>
+              </a:prstGeom>
+              <a:solidFill>
+                <a:schemeClr val="bg1"/>
+              </a:solidFill>
+              <a:ln w="19050">
+                <a:solidFill>
+                  <a:schemeClr val="tx1"/>
+                </a:solidFill>
+              </a:ln>
+            </p:spPr>
+            <p:style>
+              <a:lnRef idx="2">
+                <a:schemeClr val="accent1">
+                  <a:shade val="50000"/>
+                </a:schemeClr>
+              </a:lnRef>
+              <a:fillRef idx="1">
+                <a:schemeClr val="accent1"/>
+              </a:fillRef>
+              <a:effectRef idx="0">
+                <a:schemeClr val="accent1"/>
+              </a:effectRef>
+              <a:fontRef idx="minor">
+                <a:schemeClr val="lt1"/>
+              </a:fontRef>
+            </p:style>
+            <p:txBody>
+              <a:bodyPr rtlCol="0" anchor="ctr"/>
+              <a:lstStyle/>
+              <a:p>
+                <a:pPr algn="ctr"/>
+                <a:endParaRPr lang="ko-KR" altLang="en-US"/>
+              </a:p>
+            </p:txBody>
+          </p:sp>
+          <p:cxnSp>
+            <p:nvCxnSpPr>
+              <p:cNvPr id="49" name="직선 연결선 48">
+                <a:extLst>
+                  <a:ext uri="{FF2B5EF4-FFF2-40B4-BE49-F238E27FC236}">
+                    <a16:creationId xmlns:a16="http://schemas.microsoft.com/office/drawing/2014/main" id="{AEA5E057-1009-4417-877F-2DE3E7397126}"/>
+                  </a:ext>
+                </a:extLst>
+              </p:cNvPr>
+              <p:cNvCxnSpPr>
+                <a:cxnSpLocks/>
+                <a:stCxn id="48" idx="4"/>
+              </p:cNvCxnSpPr>
+              <p:nvPr/>
+            </p:nvCxnSpPr>
+            <p:spPr>
+              <a:xfrm>
+                <a:off x="1882065" y="2272683"/>
+                <a:ext cx="0" cy="387415"/>
+              </a:xfrm>
+              <a:prstGeom prst="line">
+                <a:avLst/>
+              </a:prstGeom>
+              <a:ln w="19050">
+                <a:solidFill>
+                  <a:schemeClr val="tx1"/>
+                </a:solidFill>
+              </a:ln>
+            </p:spPr>
+            <p:style>
+              <a:lnRef idx="1">
+                <a:schemeClr val="accent1"/>
+              </a:lnRef>
+              <a:fillRef idx="0">
+                <a:schemeClr val="accent1"/>
+              </a:fillRef>
+              <a:effectRef idx="0">
+                <a:schemeClr val="accent1"/>
+              </a:effectRef>
+              <a:fontRef idx="minor">
+                <a:schemeClr val="tx1"/>
+              </a:fontRef>
+            </p:style>
+          </p:cxnSp>
+          <p:cxnSp>
+            <p:nvCxnSpPr>
+              <p:cNvPr id="52" name="직선 연결선 51">
+                <a:extLst>
+                  <a:ext uri="{FF2B5EF4-FFF2-40B4-BE49-F238E27FC236}">
+                    <a16:creationId xmlns:a16="http://schemas.microsoft.com/office/drawing/2014/main" id="{1D4FFC50-D1DF-406E-8DED-E391956363D9}"/>
+                  </a:ext>
+                </a:extLst>
+              </p:cNvPr>
+              <p:cNvCxnSpPr>
+                <a:cxnSpLocks/>
+              </p:cNvCxnSpPr>
+              <p:nvPr/>
+            </p:nvCxnSpPr>
+            <p:spPr>
+              <a:xfrm>
+                <a:off x="1464816" y="2388093"/>
+                <a:ext cx="905522" cy="0"/>
+              </a:xfrm>
+              <a:prstGeom prst="line">
+                <a:avLst/>
+              </a:prstGeom>
+              <a:ln w="19050">
+                <a:solidFill>
+                  <a:schemeClr val="tx1"/>
+                </a:solidFill>
+              </a:ln>
+            </p:spPr>
+            <p:style>
+              <a:lnRef idx="1">
+                <a:schemeClr val="accent1"/>
+              </a:lnRef>
+              <a:fillRef idx="0">
+                <a:schemeClr val="accent1"/>
+              </a:fillRef>
+              <a:effectRef idx="0">
+                <a:schemeClr val="accent1"/>
+              </a:effectRef>
+              <a:fontRef idx="minor">
+                <a:schemeClr val="tx1"/>
+              </a:fontRef>
+            </p:style>
+          </p:cxnSp>
+          <p:cxnSp>
+            <p:nvCxnSpPr>
+              <p:cNvPr id="53" name="직선 연결선 52">
+                <a:extLst>
+                  <a:ext uri="{FF2B5EF4-FFF2-40B4-BE49-F238E27FC236}">
+                    <a16:creationId xmlns:a16="http://schemas.microsoft.com/office/drawing/2014/main" id="{5D8BC1DD-A00D-4C06-A631-A0E8ADE12414}"/>
+                  </a:ext>
+                </a:extLst>
+              </p:cNvPr>
+              <p:cNvCxnSpPr>
+                <a:cxnSpLocks/>
+              </p:cNvCxnSpPr>
+              <p:nvPr/>
+            </p:nvCxnSpPr>
+            <p:spPr>
+              <a:xfrm flipH="1">
+                <a:off x="1535836" y="2660098"/>
+                <a:ext cx="346230" cy="381739"/>
+              </a:xfrm>
+              <a:prstGeom prst="line">
+                <a:avLst/>
+              </a:prstGeom>
+              <a:ln w="19050">
+                <a:solidFill>
+                  <a:schemeClr val="tx1"/>
+                </a:solidFill>
+              </a:ln>
+            </p:spPr>
+            <p:style>
+              <a:lnRef idx="1">
+                <a:schemeClr val="accent1"/>
+              </a:lnRef>
+              <a:fillRef idx="0">
+                <a:schemeClr val="accent1"/>
+              </a:fillRef>
+              <a:effectRef idx="0">
+                <a:schemeClr val="accent1"/>
+              </a:effectRef>
+              <a:fontRef idx="minor">
+                <a:schemeClr val="tx1"/>
+              </a:fontRef>
+            </p:style>
+          </p:cxnSp>
+          <p:cxnSp>
+            <p:nvCxnSpPr>
+              <p:cNvPr id="54" name="직선 연결선 53">
+                <a:extLst>
+                  <a:ext uri="{FF2B5EF4-FFF2-40B4-BE49-F238E27FC236}">
+                    <a16:creationId xmlns:a16="http://schemas.microsoft.com/office/drawing/2014/main" id="{D728EE9C-19C1-40D8-8B2B-90E939B356D6}"/>
+                  </a:ext>
+                </a:extLst>
+              </p:cNvPr>
+              <p:cNvCxnSpPr>
+                <a:cxnSpLocks/>
+              </p:cNvCxnSpPr>
+              <p:nvPr/>
+            </p:nvCxnSpPr>
+            <p:spPr>
+              <a:xfrm>
+                <a:off x="1869424" y="2660098"/>
+                <a:ext cx="355107" cy="381739"/>
+              </a:xfrm>
+              <a:prstGeom prst="line">
+                <a:avLst/>
+              </a:prstGeom>
+              <a:ln w="19050">
+                <a:solidFill>
+                  <a:schemeClr val="tx1"/>
+                </a:solidFill>
+              </a:ln>
+            </p:spPr>
+            <p:style>
+              <a:lnRef idx="1">
+                <a:schemeClr val="accent1"/>
+              </a:lnRef>
+              <a:fillRef idx="0">
+                <a:schemeClr val="accent1"/>
+              </a:fillRef>
+              <a:effectRef idx="0">
+                <a:schemeClr val="accent1"/>
+              </a:effectRef>
+              <a:fontRef idx="minor">
+                <a:schemeClr val="tx1"/>
+              </a:fontRef>
+            </p:style>
+          </p:cxnSp>
+        </p:grpSp>
+        <p:cxnSp>
+          <p:nvCxnSpPr>
+            <p:cNvPr id="55" name="직선 연결선 54">
+              <a:extLst>
+                <a:ext uri="{FF2B5EF4-FFF2-40B4-BE49-F238E27FC236}">
+                  <a16:creationId xmlns:a16="http://schemas.microsoft.com/office/drawing/2014/main" id="{9EC42A38-CC1A-4B64-BB28-8967D4C209C3}"/>
+                </a:ext>
+              </a:extLst>
+            </p:cNvPr>
+            <p:cNvCxnSpPr>
+              <a:cxnSpLocks/>
+              <a:stCxn id="56" idx="2"/>
+            </p:cNvCxnSpPr>
+            <p:nvPr/>
+          </p:nvCxnSpPr>
+          <p:spPr>
+            <a:xfrm>
+              <a:off x="1643170" y="2396223"/>
+              <a:ext cx="0" cy="4111109"/>
+            </a:xfrm>
+            <a:prstGeom prst="line">
+              <a:avLst/>
+            </a:prstGeom>
+            <a:ln w="19050">
+              <a:solidFill>
+                <a:schemeClr val="tx1"/>
+              </a:solidFill>
+              <a:prstDash val="dash"/>
+            </a:ln>
+          </p:spPr>
+          <p:style>
+            <a:lnRef idx="1">
+              <a:schemeClr val="accent1"/>
+            </a:lnRef>
+            <a:fillRef idx="0">
+              <a:schemeClr val="accent1"/>
+            </a:fillRef>
+            <a:effectRef idx="0">
+              <a:schemeClr val="accent1"/>
+            </a:effectRef>
+            <a:fontRef idx="minor">
+              <a:schemeClr val="tx1"/>
+            </a:fontRef>
+          </p:style>
+        </p:cxnSp>
+        <p:sp>
+          <p:nvSpPr>
+            <p:cNvPr id="56" name="직사각형 55">
+              <a:extLst>
+                <a:ext uri="{FF2B5EF4-FFF2-40B4-BE49-F238E27FC236}">
+                  <a16:creationId xmlns:a16="http://schemas.microsoft.com/office/drawing/2014/main" id="{09610118-BC28-4091-AEC3-0D2A2F57BCF0}"/>
+                </a:ext>
+              </a:extLst>
+            </p:cNvPr>
+            <p:cNvSpPr/>
+            <p:nvPr/>
+          </p:nvSpPr>
+          <p:spPr>
+            <a:xfrm>
+              <a:off x="1332027" y="2026891"/>
+              <a:ext cx="622286" cy="369332"/>
+            </a:xfrm>
+            <a:prstGeom prst="rect">
+              <a:avLst/>
+            </a:prstGeom>
+          </p:spPr>
+          <p:txBody>
+            <a:bodyPr wrap="none">
+              <a:spAutoFit/>
+            </a:bodyPr>
+            <a:lstStyle/>
+            <a:p>
+              <a:pPr algn="ctr"/>
+              <a:r>
+                <a:rPr lang="en-US" altLang="ko-KR" dirty="0"/>
+                <a:t>user</a:t>
+              </a:r>
+              <a:endParaRPr lang="ko-KR" altLang="en-US" dirty="0"/>
+            </a:p>
+          </p:txBody>
+        </p:sp>
+        <p:sp>
+          <p:nvSpPr>
+            <p:cNvPr id="57" name="직사각형 56">
+              <a:extLst>
+                <a:ext uri="{FF2B5EF4-FFF2-40B4-BE49-F238E27FC236}">
+                  <a16:creationId xmlns:a16="http://schemas.microsoft.com/office/drawing/2014/main" id="{2C544252-260B-485E-A27C-61C61DD4D5CB}"/>
+                </a:ext>
+              </a:extLst>
+            </p:cNvPr>
+            <p:cNvSpPr/>
+            <p:nvPr/>
+          </p:nvSpPr>
+          <p:spPr>
+            <a:xfrm>
+              <a:off x="1547520" y="2704729"/>
+              <a:ext cx="204448" cy="3549766"/>
+            </a:xfrm>
+            <a:prstGeom prst="rect">
+              <a:avLst/>
+            </a:prstGeom>
+            <a:solidFill>
+              <a:schemeClr val="bg1"/>
+            </a:solidFill>
+            <a:ln w="12700">
+              <a:solidFill>
+                <a:schemeClr val="tx1"/>
+              </a:solidFill>
+            </a:ln>
+          </p:spPr>
+          <p:style>
+            <a:lnRef idx="2">
+              <a:schemeClr val="accent1">
+                <a:shade val="50000"/>
+              </a:schemeClr>
+            </a:lnRef>
+            <a:fillRef idx="1">
+              <a:schemeClr val="accent1"/>
+            </a:fillRef>
+            <a:effectRef idx="0">
+              <a:schemeClr val="accent1"/>
+            </a:effectRef>
+            <a:fontRef idx="minor">
+              <a:schemeClr val="lt1"/>
+            </a:fontRef>
+          </p:style>
+          <p:txBody>
+            <a:bodyPr rtlCol="0" anchor="ctr"/>
+            <a:lstStyle/>
+            <a:p>
+              <a:pPr algn="ctr"/>
+              <a:endParaRPr lang="ko-KR" altLang="en-US"/>
+            </a:p>
+          </p:txBody>
+        </p:sp>
+        <p:sp>
+          <p:nvSpPr>
+            <p:cNvPr id="17" name="직사각형 16">
+              <a:extLst>
+                <a:ext uri="{FF2B5EF4-FFF2-40B4-BE49-F238E27FC236}">
+                  <a16:creationId xmlns:a16="http://schemas.microsoft.com/office/drawing/2014/main" id="{A8852F14-4852-4A9B-AA48-4347D197D878}"/>
+                </a:ext>
+              </a:extLst>
+            </p:cNvPr>
+            <p:cNvSpPr/>
+            <p:nvPr/>
+          </p:nvSpPr>
+          <p:spPr>
+            <a:xfrm>
+              <a:off x="1681450" y="2390122"/>
+              <a:ext cx="282450" cy="369332"/>
+            </a:xfrm>
+            <a:prstGeom prst="rect">
+              <a:avLst/>
+            </a:prstGeom>
+          </p:spPr>
+          <p:txBody>
+            <a:bodyPr wrap="none">
+              <a:spAutoFit/>
+            </a:bodyPr>
+            <a:lstStyle/>
+            <a:p>
+              <a:r>
+                <a:rPr lang="en-US" altLang="ko-KR" dirty="0"/>
+                <a:t>*</a:t>
+              </a:r>
+              <a:endParaRPr lang="ko-KR" altLang="en-US" dirty="0"/>
+            </a:p>
+          </p:txBody>
+        </p:sp>
+        <p:cxnSp>
+          <p:nvCxnSpPr>
+            <p:cNvPr id="58" name="직선 화살표 연결선 57">
+              <a:extLst>
+                <a:ext uri="{FF2B5EF4-FFF2-40B4-BE49-F238E27FC236}">
+                  <a16:creationId xmlns:a16="http://schemas.microsoft.com/office/drawing/2014/main" id="{D5745BF1-1AA0-4DA0-B3C6-184B5866E45E}"/>
+                </a:ext>
+              </a:extLst>
+            </p:cNvPr>
+            <p:cNvCxnSpPr>
+              <a:cxnSpLocks/>
+            </p:cNvCxnSpPr>
+            <p:nvPr/>
+          </p:nvCxnSpPr>
+          <p:spPr>
+            <a:xfrm flipH="1">
+              <a:off x="1783995" y="5737863"/>
+              <a:ext cx="4877521" cy="0"/>
+            </a:xfrm>
+            <a:prstGeom prst="straightConnector1">
+              <a:avLst/>
+            </a:prstGeom>
+            <a:ln w="12700">
+              <a:solidFill>
+                <a:schemeClr val="tx1"/>
+              </a:solidFill>
+              <a:tailEnd type="triangle"/>
+            </a:ln>
+          </p:spPr>
+          <p:style>
+            <a:lnRef idx="1">
+              <a:schemeClr val="accent1"/>
+            </a:lnRef>
+            <a:fillRef idx="0">
+              <a:schemeClr val="accent1"/>
+            </a:fillRef>
+            <a:effectRef idx="0">
+              <a:schemeClr val="accent1"/>
+            </a:effectRef>
+            <a:fontRef idx="minor">
+              <a:schemeClr val="tx1"/>
+            </a:fontRef>
+          </p:style>
+        </p:cxnSp>
+        <p:grpSp>
+          <p:nvGrpSpPr>
+            <p:cNvPr id="29" name="그룹 28">
+              <a:extLst>
+                <a:ext uri="{FF2B5EF4-FFF2-40B4-BE49-F238E27FC236}">
+                  <a16:creationId xmlns:a16="http://schemas.microsoft.com/office/drawing/2014/main" id="{BF9E0B35-248B-48B4-872D-62C2C2315CB0}"/>
+                </a:ext>
+              </a:extLst>
+            </p:cNvPr>
+            <p:cNvGrpSpPr/>
+            <p:nvPr/>
+          </p:nvGrpSpPr>
+          <p:grpSpPr>
+            <a:xfrm>
+              <a:off x="1358892" y="3461906"/>
+              <a:ext cx="9027173" cy="2496675"/>
+              <a:chOff x="826664" y="2804035"/>
+              <a:chExt cx="9457309" cy="2107997"/>
+            </a:xfrm>
+          </p:grpSpPr>
+          <p:sp>
+            <p:nvSpPr>
+              <p:cNvPr id="30" name="직사각형 29">
+                <a:extLst>
+                  <a:ext uri="{FF2B5EF4-FFF2-40B4-BE49-F238E27FC236}">
+                    <a16:creationId xmlns:a16="http://schemas.microsoft.com/office/drawing/2014/main" id="{6046CD66-3BDD-4E1D-A233-46E90C7132AF}"/>
+                  </a:ext>
+                </a:extLst>
+              </p:cNvPr>
+              <p:cNvSpPr/>
+              <p:nvPr/>
+            </p:nvSpPr>
+            <p:spPr>
+              <a:xfrm>
+                <a:off x="826665" y="2807834"/>
+                <a:ext cx="9457308" cy="2104198"/>
+              </a:xfrm>
+              <a:prstGeom prst="rect">
+                <a:avLst/>
+              </a:prstGeom>
+              <a:noFill/>
+              <a:ln>
+                <a:solidFill>
+                  <a:schemeClr val="tx1"/>
+                </a:solidFill>
+              </a:ln>
+            </p:spPr>
+            <p:style>
+              <a:lnRef idx="2">
+                <a:schemeClr val="accent1">
+                  <a:shade val="50000"/>
+                </a:schemeClr>
+              </a:lnRef>
+              <a:fillRef idx="1">
+                <a:schemeClr val="accent1"/>
+              </a:fillRef>
+              <a:effectRef idx="0">
+                <a:schemeClr val="accent1"/>
+              </a:effectRef>
+              <a:fontRef idx="minor">
+                <a:schemeClr val="lt1"/>
+              </a:fontRef>
+            </p:style>
+            <p:txBody>
+              <a:bodyPr rtlCol="0" anchor="ctr"/>
+              <a:lstStyle/>
+              <a:p>
+                <a:pPr algn="ctr"/>
+                <a:endParaRPr lang="ko-KR" altLang="en-US"/>
+              </a:p>
+            </p:txBody>
+          </p:sp>
+          <p:sp>
+            <p:nvSpPr>
+              <p:cNvPr id="31" name="직사각형 30">
+                <a:extLst>
+                  <a:ext uri="{FF2B5EF4-FFF2-40B4-BE49-F238E27FC236}">
+                    <a16:creationId xmlns:a16="http://schemas.microsoft.com/office/drawing/2014/main" id="{4491BAFE-BD42-4111-BC19-BC6BBA2E57AC}"/>
+                  </a:ext>
+                </a:extLst>
+              </p:cNvPr>
+              <p:cNvSpPr/>
+              <p:nvPr/>
+            </p:nvSpPr>
+            <p:spPr>
+              <a:xfrm>
+                <a:off x="826664" y="2804035"/>
+                <a:ext cx="621969" cy="285724"/>
+              </a:xfrm>
+              <a:prstGeom prst="rect">
+                <a:avLst/>
+              </a:prstGeom>
+              <a:solidFill>
+                <a:schemeClr val="bg2"/>
+              </a:solidFill>
+              <a:ln>
+                <a:solidFill>
+                  <a:schemeClr val="tx1"/>
+                </a:solidFill>
+              </a:ln>
+            </p:spPr>
+            <p:style>
+              <a:lnRef idx="2">
+                <a:schemeClr val="accent1">
+                  <a:shade val="50000"/>
+                </a:schemeClr>
+              </a:lnRef>
+              <a:fillRef idx="1">
+                <a:schemeClr val="accent1"/>
+              </a:fillRef>
+              <a:effectRef idx="0">
+                <a:schemeClr val="accent1"/>
+              </a:effectRef>
+              <a:fontRef idx="minor">
+                <a:schemeClr val="lt1"/>
+              </a:fontRef>
+            </p:style>
+            <p:txBody>
+              <a:bodyPr rtlCol="0" anchor="ctr"/>
+              <a:lstStyle/>
+              <a:p>
+                <a:pPr algn="ctr"/>
+                <a:r>
+                  <a:rPr lang="en-US" altLang="ko-KR" sz="1400" dirty="0">
+                    <a:solidFill>
+                      <a:schemeClr val="tx1"/>
+                    </a:solidFill>
+                  </a:rPr>
+                  <a:t>Alt</a:t>
+                </a:r>
+              </a:p>
+            </p:txBody>
+          </p:sp>
+        </p:grpSp>
+        <p:sp>
+          <p:nvSpPr>
+            <p:cNvPr id="40" name="직사각형 39">
+              <a:extLst>
+                <a:ext uri="{FF2B5EF4-FFF2-40B4-BE49-F238E27FC236}">
+                  <a16:creationId xmlns:a16="http://schemas.microsoft.com/office/drawing/2014/main" id="{93C19457-08B3-4498-8549-0F0C36CD002A}"/>
+                </a:ext>
+              </a:extLst>
+            </p:cNvPr>
+            <p:cNvSpPr/>
+            <p:nvPr/>
+          </p:nvSpPr>
+          <p:spPr>
+            <a:xfrm>
+              <a:off x="1358892" y="4495618"/>
+              <a:ext cx="2006640" cy="276999"/>
+            </a:xfrm>
+            <a:prstGeom prst="rect">
+              <a:avLst/>
+            </a:prstGeom>
+          </p:spPr>
+          <p:txBody>
+            <a:bodyPr wrap="none">
+              <a:spAutoFit/>
+            </a:bodyPr>
+            <a:lstStyle/>
+            <a:p>
+              <a:r>
+                <a:rPr lang="en-US" altLang="ko-KR" sz="1200" b="1" dirty="0"/>
+                <a:t>[</a:t>
+              </a:r>
+              <a:r>
+                <a:rPr lang="en-US" altLang="ko-KR" sz="1200" b="1" dirty="0" err="1"/>
+                <a:t>sendTrue</a:t>
+              </a:r>
+              <a:r>
+                <a:rPr lang="en-US" altLang="ko-KR" sz="1200" b="1" dirty="0"/>
+                <a:t> = FLAG_TRUE]</a:t>
+              </a:r>
+              <a:endParaRPr lang="ko-KR" altLang="en-US" sz="1200" b="1" dirty="0"/>
+            </a:p>
+          </p:txBody>
+        </p:sp>
+        <p:cxnSp>
+          <p:nvCxnSpPr>
+            <p:cNvPr id="64" name="직선 화살표 연결선 63">
+              <a:extLst>
+                <a:ext uri="{FF2B5EF4-FFF2-40B4-BE49-F238E27FC236}">
+                  <a16:creationId xmlns:a16="http://schemas.microsoft.com/office/drawing/2014/main" id="{24AB6620-0412-43C9-A75C-6EFF8A899E4E}"/>
+                </a:ext>
+              </a:extLst>
+            </p:cNvPr>
+            <p:cNvCxnSpPr>
+              <a:cxnSpLocks/>
+            </p:cNvCxnSpPr>
+            <p:nvPr/>
+          </p:nvCxnSpPr>
+          <p:spPr>
+            <a:xfrm>
+              <a:off x="6645834" y="4932114"/>
+              <a:ext cx="3283816" cy="0"/>
+            </a:xfrm>
+            <a:prstGeom prst="straightConnector1">
+              <a:avLst/>
+            </a:prstGeom>
+            <a:ln w="12700">
+              <a:solidFill>
+                <a:schemeClr val="tx1"/>
+              </a:solidFill>
+              <a:tailEnd type="triangle"/>
+            </a:ln>
+          </p:spPr>
+          <p:style>
+            <a:lnRef idx="1">
+              <a:schemeClr val="accent1"/>
+            </a:lnRef>
+            <a:fillRef idx="0">
+              <a:schemeClr val="accent1"/>
+            </a:fillRef>
+            <a:effectRef idx="0">
+              <a:schemeClr val="accent1"/>
+            </a:effectRef>
+            <a:fontRef idx="minor">
+              <a:schemeClr val="tx1"/>
+            </a:fontRef>
+          </p:style>
+        </p:cxnSp>
+        <p:cxnSp>
+          <p:nvCxnSpPr>
+            <p:cNvPr id="69" name="직선 화살표 연결선 68">
+              <a:extLst>
+                <a:ext uri="{FF2B5EF4-FFF2-40B4-BE49-F238E27FC236}">
+                  <a16:creationId xmlns:a16="http://schemas.microsoft.com/office/drawing/2014/main" id="{DFAC113E-8CBC-4A30-8C30-D9DABCB874DB}"/>
+                </a:ext>
+              </a:extLst>
+            </p:cNvPr>
+            <p:cNvCxnSpPr>
+              <a:cxnSpLocks/>
+            </p:cNvCxnSpPr>
+            <p:nvPr/>
+          </p:nvCxnSpPr>
+          <p:spPr>
+            <a:xfrm flipH="1">
+              <a:off x="6645834" y="5391504"/>
+              <a:ext cx="3298542" cy="0"/>
+            </a:xfrm>
+            <a:prstGeom prst="straightConnector1">
+              <a:avLst/>
+            </a:prstGeom>
+            <a:ln w="12700">
+              <a:solidFill>
+                <a:schemeClr val="tx1"/>
+              </a:solidFill>
+              <a:prstDash val="dash"/>
+              <a:tailEnd type="triangle"/>
+            </a:ln>
+          </p:spPr>
+          <p:style>
+            <a:lnRef idx="1">
+              <a:schemeClr val="accent1"/>
+            </a:lnRef>
+            <a:fillRef idx="0">
+              <a:schemeClr val="accent1"/>
+            </a:fillRef>
+            <a:effectRef idx="0">
+              <a:schemeClr val="accent1"/>
+            </a:effectRef>
+            <a:fontRef idx="minor">
+              <a:schemeClr val="tx1"/>
+            </a:fontRef>
+          </p:style>
+        </p:cxnSp>
+        <p:sp>
+          <p:nvSpPr>
+            <p:cNvPr id="70" name="TextBox 69">
+              <a:extLst>
+                <a:ext uri="{FF2B5EF4-FFF2-40B4-BE49-F238E27FC236}">
+                  <a16:creationId xmlns:a16="http://schemas.microsoft.com/office/drawing/2014/main" id="{DA1BA339-EBB9-44A4-AE8E-F3365F51F5CC}"/>
+                </a:ext>
+              </a:extLst>
+            </p:cNvPr>
+            <p:cNvSpPr txBox="1"/>
+            <p:nvPr/>
+          </p:nvSpPr>
+          <p:spPr>
+            <a:xfrm>
+              <a:off x="8158276" y="5055246"/>
+              <a:ext cx="1295389" cy="307777"/>
+            </a:xfrm>
+            <a:prstGeom prst="rect">
+              <a:avLst/>
+            </a:prstGeom>
+            <a:noFill/>
+          </p:spPr>
+          <p:txBody>
+            <a:bodyPr wrap="square" rtlCol="0">
+              <a:spAutoFit/>
+            </a:bodyPr>
+            <a:lstStyle/>
+            <a:p>
+              <a:r>
+                <a:rPr lang="en-US" altLang="ko-KR" sz="1400" dirty="0" err="1"/>
+                <a:t>LoginUser</a:t>
+              </a:r>
+              <a:r>
+                <a:rPr lang="en-US" altLang="ko-KR" sz="1400" dirty="0"/>
+                <a:t>()</a:t>
+              </a:r>
+              <a:endParaRPr lang="ko-KR" altLang="en-US" sz="1400" dirty="0"/>
+            </a:p>
+          </p:txBody>
+        </p:sp>
+        <p:cxnSp>
+          <p:nvCxnSpPr>
+            <p:cNvPr id="39" name="직선 연결선 38">
+              <a:extLst>
+                <a:ext uri="{FF2B5EF4-FFF2-40B4-BE49-F238E27FC236}">
+                  <a16:creationId xmlns:a16="http://schemas.microsoft.com/office/drawing/2014/main" id="{98E7BCC2-3FED-44C6-BB74-BCA7575EAE87}"/>
+                </a:ext>
+              </a:extLst>
+            </p:cNvPr>
+            <p:cNvCxnSpPr>
+              <a:cxnSpLocks/>
+            </p:cNvCxnSpPr>
+            <p:nvPr/>
+          </p:nvCxnSpPr>
+          <p:spPr>
+            <a:xfrm flipV="1">
+              <a:off x="1358892" y="4433933"/>
+              <a:ext cx="9027172" cy="21045"/>
+            </a:xfrm>
+            <a:prstGeom prst="line">
+              <a:avLst/>
+            </a:prstGeom>
+            <a:ln>
+              <a:solidFill>
+                <a:schemeClr val="tx1"/>
+              </a:solidFill>
+              <a:prstDash val="dash"/>
+            </a:ln>
+          </p:spPr>
+          <p:style>
+            <a:lnRef idx="1">
+              <a:schemeClr val="accent1"/>
+            </a:lnRef>
+            <a:fillRef idx="0">
+              <a:schemeClr val="accent1"/>
+            </a:fillRef>
+            <a:effectRef idx="0">
+              <a:schemeClr val="accent1"/>
+            </a:effectRef>
+            <a:fontRef idx="minor">
+              <a:schemeClr val="tx1"/>
+            </a:fontRef>
+          </p:style>
+        </p:cxnSp>
+        <p:sp>
+          <p:nvSpPr>
+            <p:cNvPr id="71" name="TextBox 70">
+              <a:extLst>
+                <a:ext uri="{FF2B5EF4-FFF2-40B4-BE49-F238E27FC236}">
+                  <a16:creationId xmlns:a16="http://schemas.microsoft.com/office/drawing/2014/main" id="{42593E68-D4E6-40A0-947F-6AE002B27F08}"/>
+                </a:ext>
+              </a:extLst>
+            </p:cNvPr>
+            <p:cNvSpPr txBox="1"/>
+            <p:nvPr/>
+          </p:nvSpPr>
+          <p:spPr>
+            <a:xfrm>
+              <a:off x="2150724" y="5430076"/>
+              <a:ext cx="3119877" cy="307777"/>
+            </a:xfrm>
+            <a:prstGeom prst="rect">
+              <a:avLst/>
+            </a:prstGeom>
+            <a:noFill/>
+          </p:spPr>
+          <p:txBody>
+            <a:bodyPr wrap="square" rtlCol="0">
+              <a:spAutoFit/>
+            </a:bodyPr>
+            <a:lstStyle/>
+            <a:p>
+              <a:r>
+                <a:rPr lang="en-US" altLang="ko-KR" sz="1400" dirty="0" err="1"/>
+                <a:t>Send_MSG</a:t>
+              </a:r>
+              <a:r>
+                <a:rPr lang="en-US" altLang="ko-KR" sz="1400" dirty="0"/>
+                <a:t>(</a:t>
+              </a:r>
+              <a:r>
+                <a:rPr lang="en-US" altLang="ko-KR" sz="1400" dirty="0" err="1"/>
+                <a:t>sMsg</a:t>
+              </a:r>
+              <a:r>
+                <a:rPr lang="en-US" altLang="ko-KR" sz="1400" dirty="0"/>
+                <a:t>, </a:t>
+              </a:r>
+              <a:r>
+                <a:rPr lang="en-US" altLang="ko-KR" sz="1400" dirty="0" err="1"/>
+                <a:t>sNickName</a:t>
+              </a:r>
+              <a:r>
+                <a:rPr lang="en-US" altLang="ko-KR" sz="1400" dirty="0"/>
+                <a:t> )</a:t>
+              </a:r>
+              <a:endParaRPr lang="ko-KR" altLang="en-US" sz="1400" dirty="0"/>
+            </a:p>
+          </p:txBody>
+        </p:sp>
+      </p:grpSp>
+    </p:spTree>
+    <p:extLst>
+      <p:ext uri="{BB962C8B-B14F-4D97-AF65-F5344CB8AC3E}">
+        <p14:creationId xmlns:p14="http://schemas.microsoft.com/office/powerpoint/2010/main" val="2463706457"/>
+      </p:ext>
+    </p:extLst>
+  </p:cSld>
+  <p:clrMapOvr>
+    <a:masterClrMapping/>
+  </p:clrMapOvr>
+</p:sld>
+</file>
+
 <file path=ppt/theme/theme1.xml><?xml version="1.0" encoding="utf-8"?>
 <a:theme xmlns:a="http://schemas.openxmlformats.org/drawingml/2006/main" name="Office 테마">
   <a:themeElements>

</xml_diff>